<commit_message>
:otter:	Replace test environment by test fruit + Cleaning
</commit_message>
<xml_diff>
--- a/figures/Fig1.pptx
+++ b/figures/Fig1.pptx
@@ -243,7 +243,7 @@
           <a:p>
             <a:fld id="{AE5C79E0-36D0-2B46-92E2-156ED97467E3}" type="datetimeFigureOut">
               <a:rPr lang="en-US" smtClean="0"/>
-              <a:t>6/16/22</a:t>
+              <a:t>6/20/22</a:t>
             </a:fld>
             <a:endParaRPr lang="en-US"/>
           </a:p>
@@ -413,7 +413,7 @@
           <a:p>
             <a:fld id="{AE5C79E0-36D0-2B46-92E2-156ED97467E3}" type="datetimeFigureOut">
               <a:rPr lang="en-US" smtClean="0"/>
-              <a:t>6/16/22</a:t>
+              <a:t>6/20/22</a:t>
             </a:fld>
             <a:endParaRPr lang="en-US"/>
           </a:p>
@@ -593,7 +593,7 @@
           <a:p>
             <a:fld id="{AE5C79E0-36D0-2B46-92E2-156ED97467E3}" type="datetimeFigureOut">
               <a:rPr lang="en-US" smtClean="0"/>
-              <a:t>6/16/22</a:t>
+              <a:t>6/20/22</a:t>
             </a:fld>
             <a:endParaRPr lang="en-US"/>
           </a:p>
@@ -763,7 +763,7 @@
           <a:p>
             <a:fld id="{AE5C79E0-36D0-2B46-92E2-156ED97467E3}" type="datetimeFigureOut">
               <a:rPr lang="en-US" smtClean="0"/>
-              <a:t>6/16/22</a:t>
+              <a:t>6/20/22</a:t>
             </a:fld>
             <a:endParaRPr lang="en-US"/>
           </a:p>
@@ -1007,7 +1007,7 @@
           <a:p>
             <a:fld id="{AE5C79E0-36D0-2B46-92E2-156ED97467E3}" type="datetimeFigureOut">
               <a:rPr lang="en-US" smtClean="0"/>
-              <a:t>6/16/22</a:t>
+              <a:t>6/20/22</a:t>
             </a:fld>
             <a:endParaRPr lang="en-US"/>
           </a:p>
@@ -1239,7 +1239,7 @@
           <a:p>
             <a:fld id="{AE5C79E0-36D0-2B46-92E2-156ED97467E3}" type="datetimeFigureOut">
               <a:rPr lang="en-US" smtClean="0"/>
-              <a:t>6/16/22</a:t>
+              <a:t>6/20/22</a:t>
             </a:fld>
             <a:endParaRPr lang="en-US"/>
           </a:p>
@@ -1606,7 +1606,7 @@
           <a:p>
             <a:fld id="{AE5C79E0-36D0-2B46-92E2-156ED97467E3}" type="datetimeFigureOut">
               <a:rPr lang="en-US" smtClean="0"/>
-              <a:t>6/16/22</a:t>
+              <a:t>6/20/22</a:t>
             </a:fld>
             <a:endParaRPr lang="en-US"/>
           </a:p>
@@ -1724,7 +1724,7 @@
           <a:p>
             <a:fld id="{AE5C79E0-36D0-2B46-92E2-156ED97467E3}" type="datetimeFigureOut">
               <a:rPr lang="en-US" smtClean="0"/>
-              <a:t>6/16/22</a:t>
+              <a:t>6/20/22</a:t>
             </a:fld>
             <a:endParaRPr lang="en-US"/>
           </a:p>
@@ -1819,7 +1819,7 @@
           <a:p>
             <a:fld id="{AE5C79E0-36D0-2B46-92E2-156ED97467E3}" type="datetimeFigureOut">
               <a:rPr lang="en-US" smtClean="0"/>
-              <a:t>6/16/22</a:t>
+              <a:t>6/20/22</a:t>
             </a:fld>
             <a:endParaRPr lang="en-US"/>
           </a:p>
@@ -2096,7 +2096,7 @@
           <a:p>
             <a:fld id="{AE5C79E0-36D0-2B46-92E2-156ED97467E3}" type="datetimeFigureOut">
               <a:rPr lang="en-US" smtClean="0"/>
-              <a:t>6/16/22</a:t>
+              <a:t>6/20/22</a:t>
             </a:fld>
             <a:endParaRPr lang="en-US"/>
           </a:p>
@@ -2353,7 +2353,7 @@
           <a:p>
             <a:fld id="{AE5C79E0-36D0-2B46-92E2-156ED97467E3}" type="datetimeFigureOut">
               <a:rPr lang="en-US" smtClean="0"/>
-              <a:t>6/16/22</a:t>
+              <a:t>6/20/22</a:t>
             </a:fld>
             <a:endParaRPr lang="en-US"/>
           </a:p>
@@ -2566,7 +2566,7 @@
           <a:p>
             <a:fld id="{AE5C79E0-36D0-2B46-92E2-156ED97467E3}" type="datetimeFigureOut">
               <a:rPr lang="en-US" smtClean="0"/>
-              <a:t>6/16/22</a:t>
+              <a:t>6/20/22</a:t>
             </a:fld>
             <a:endParaRPr lang="en-US"/>
           </a:p>
@@ -2985,7 +2985,7 @@
         </p:nvGrpSpPr>
         <p:grpSpPr>
           <a:xfrm>
-            <a:off x="640816" y="-4902"/>
+            <a:off x="640816" y="-54330"/>
             <a:ext cx="8492313" cy="5216719"/>
             <a:chOff x="715027" y="5161608"/>
             <a:chExt cx="8492313" cy="5216719"/>
@@ -4752,8 +4752,8 @@
           </p:nvSpPr>
           <p:spPr>
             <a:xfrm>
-              <a:off x="7286329" y="10008995"/>
-              <a:ext cx="1815818" cy="369332"/>
+              <a:off x="7711513" y="10008995"/>
+              <a:ext cx="1011174" cy="369332"/>
             </a:xfrm>
             <a:prstGeom prst="rect">
               <a:avLst/>
@@ -4768,7 +4768,7 @@
             <a:p>
               <a:r>
                 <a:rPr lang="en-US" dirty="0"/>
-                <a:t>Test environment</a:t>
+                <a:t>Test fruit</a:t>
               </a:r>
             </a:p>
           </p:txBody>
@@ -4912,8 +4912,8 @@
           </p:nvSpPr>
           <p:spPr>
             <a:xfrm>
-              <a:off x="7296431" y="7647837"/>
-              <a:ext cx="1815818" cy="369332"/>
+              <a:off x="7711513" y="7647837"/>
+              <a:ext cx="1011174" cy="369332"/>
             </a:xfrm>
             <a:prstGeom prst="rect">
               <a:avLst/>
@@ -4928,7 +4928,7 @@
             <a:p>
               <a:r>
                 <a:rPr lang="en-US" dirty="0"/>
-                <a:t>Test environment</a:t>
+                <a:t>Test fruit</a:t>
               </a:r>
             </a:p>
           </p:txBody>
@@ -7248,9 +7248,9 @@
         <p:grpSpPr>
           <a:xfrm>
             <a:off x="692222" y="10344425"/>
-            <a:ext cx="9130911" cy="6810974"/>
+            <a:ext cx="9186760" cy="6810974"/>
             <a:chOff x="-6208192" y="10211785"/>
-            <a:chExt cx="9130911" cy="6810974"/>
+            <a:chExt cx="9186760" cy="6810974"/>
           </a:xfrm>
         </p:grpSpPr>
         <p:cxnSp>
@@ -9014,8 +9014,8 @@
           </p:nvSpPr>
           <p:spPr>
             <a:xfrm>
-              <a:off x="363110" y="15059172"/>
-              <a:ext cx="1815818" cy="369332"/>
+              <a:off x="788291" y="15059172"/>
+              <a:ext cx="1011174" cy="369332"/>
             </a:xfrm>
             <a:prstGeom prst="rect">
               <a:avLst/>
@@ -9030,7 +9030,7 @@
             <a:p>
               <a:r>
                 <a:rPr lang="en-US" dirty="0"/>
-                <a:t>Test environment</a:t>
+                <a:t>Test fruit</a:t>
               </a:r>
             </a:p>
           </p:txBody>
@@ -9174,8 +9174,8 @@
           </p:nvSpPr>
           <p:spPr>
             <a:xfrm>
-              <a:off x="373212" y="12698014"/>
-              <a:ext cx="1815818" cy="369332"/>
+              <a:off x="788291" y="12698014"/>
+              <a:ext cx="1011174" cy="369332"/>
             </a:xfrm>
             <a:prstGeom prst="rect">
               <a:avLst/>
@@ -9190,7 +9190,7 @@
             <a:p>
               <a:r>
                 <a:rPr lang="en-US" dirty="0"/>
-                <a:t>Test environment</a:t>
+                <a:t>Test fruit</a:t>
               </a:r>
             </a:p>
           </p:txBody>
@@ -9280,9 +9280,9 @@
           <p:grpSpPr>
             <a:xfrm>
               <a:off x="-4259041" y="15545431"/>
-              <a:ext cx="1257908" cy="1477328"/>
+              <a:ext cx="1322029" cy="1477328"/>
               <a:chOff x="2602600" y="11018466"/>
-              <a:chExt cx="1257908" cy="1477328"/>
+              <a:chExt cx="1322029" cy="1477328"/>
             </a:xfrm>
           </p:grpSpPr>
           <p:sp>
@@ -9300,7 +9300,7 @@
             <p:spPr>
               <a:xfrm>
                 <a:off x="2602600" y="11018466"/>
-                <a:ext cx="1257908" cy="1477328"/>
+                <a:ext cx="1322029" cy="1477328"/>
               </a:xfrm>
               <a:prstGeom prst="rect">
                 <a:avLst/>
@@ -9315,7 +9315,7 @@
               <a:p>
                 <a:r>
                   <a:rPr lang="en-US" b="1" dirty="0"/>
-                  <a:t>Generation</a:t>
+                  <a:t>Generation:</a:t>
                 </a:r>
               </a:p>
               <a:p>
@@ -9928,7 +9928,7 @@
               <a:p>
                 <a:r>
                   <a:rPr lang="en-US" b="1" dirty="0"/>
-                  <a:t>Phenotypic optima </a:t>
+                  <a:t>Phenotypic optima:</a:t>
                 </a:r>
               </a:p>
               <a:p>
@@ -9967,9 +9967,9 @@
           <p:grpSpPr>
             <a:xfrm>
               <a:off x="1443019" y="15545431"/>
-              <a:ext cx="1479700" cy="1477328"/>
+              <a:ext cx="1535549" cy="1477328"/>
               <a:chOff x="7153793" y="11026656"/>
-              <a:chExt cx="1479700" cy="1477328"/>
+              <a:chExt cx="1535549" cy="1477328"/>
             </a:xfrm>
           </p:grpSpPr>
           <p:sp>
@@ -9987,7 +9987,7 @@
             <p:spPr>
               <a:xfrm>
                 <a:off x="7153793" y="11026656"/>
-                <a:ext cx="1479700" cy="1477328"/>
+                <a:ext cx="1535549" cy="1477328"/>
               </a:xfrm>
               <a:prstGeom prst="rect">
                 <a:avLst/>
@@ -10002,19 +10002,19 @@
               <a:p>
                 <a:r>
                   <a:rPr lang="en-US" b="1" dirty="0"/>
-                  <a:t>Environment</a:t>
+                  <a:t>Test fruit:</a:t>
                 </a:r>
               </a:p>
               <a:p>
                 <a:r>
                   <a:rPr lang="en-US" dirty="0"/>
-                  <a:t>      Allopatric</a:t>
+                  <a:t>      Alternative</a:t>
                 </a:r>
               </a:p>
               <a:p>
                 <a:r>
                   <a:rPr lang="en-US" dirty="0"/>
-                  <a:t>      Sympatric</a:t>
+                  <a:t>      Original</a:t>
                 </a:r>
               </a:p>
               <a:p>
@@ -11316,7 +11316,7 @@
               <a:p>
                 <a:r>
                   <a:rPr lang="en-US" b="1" dirty="0"/>
-                  <a:t>Population from</a:t>
+                  <a:t>Population from:</a:t>
                 </a:r>
               </a:p>
               <a:p>
@@ -11747,7 +11747,7 @@
               <a:p>
                 <a:r>
                   <a:rPr lang="en-US" b="1" dirty="0"/>
-                  <a:t>Population from</a:t>
+                  <a:t>Population from:</a:t>
                 </a:r>
               </a:p>
               <a:p>
@@ -14822,8 +14822,8 @@
           </p:nvSpPr>
           <p:spPr>
             <a:xfrm>
-              <a:off x="7240069" y="4936357"/>
-              <a:ext cx="1815818" cy="369332"/>
+              <a:off x="7591112" y="4936357"/>
+              <a:ext cx="1011174" cy="369332"/>
             </a:xfrm>
             <a:prstGeom prst="rect">
               <a:avLst/>
@@ -14838,7 +14838,7 @@
             <a:p>
               <a:r>
                 <a:rPr lang="en-US" dirty="0"/>
-                <a:t>Test environment</a:t>
+                <a:t>Test fruit</a:t>
               </a:r>
             </a:p>
           </p:txBody>
@@ -14982,8 +14982,8 @@
           </p:nvSpPr>
           <p:spPr>
             <a:xfrm>
-              <a:off x="7250171" y="2575199"/>
-              <a:ext cx="1815818" cy="369332"/>
+              <a:off x="7591112" y="2575199"/>
+              <a:ext cx="1011174" cy="369332"/>
             </a:xfrm>
             <a:prstGeom prst="rect">
               <a:avLst/>
@@ -14998,7 +14998,7 @@
             <a:p>
               <a:r>
                 <a:rPr lang="en-US" dirty="0"/>
-                <a:t>Test environment</a:t>
+                <a:t>Test fruit</a:t>
               </a:r>
             </a:p>
           </p:txBody>

</xml_diff>

<commit_message>
:dog: clean figure 1 with correct legend
</commit_message>
<xml_diff>
--- a/figures/Fig1.pptx
+++ b/figures/Fig1.pptx
@@ -243,7 +243,7 @@
           <a:p>
             <a:fld id="{AE5C79E0-36D0-2B46-92E2-156ED97467E3}" type="datetimeFigureOut">
               <a:rPr lang="en-US" smtClean="0"/>
-              <a:t>6/20/22</a:t>
+              <a:t>7/12/22</a:t>
             </a:fld>
             <a:endParaRPr lang="en-US"/>
           </a:p>
@@ -413,7 +413,7 @@
           <a:p>
             <a:fld id="{AE5C79E0-36D0-2B46-92E2-156ED97467E3}" type="datetimeFigureOut">
               <a:rPr lang="en-US" smtClean="0"/>
-              <a:t>6/20/22</a:t>
+              <a:t>7/12/22</a:t>
             </a:fld>
             <a:endParaRPr lang="en-US"/>
           </a:p>
@@ -593,7 +593,7 @@
           <a:p>
             <a:fld id="{AE5C79E0-36D0-2B46-92E2-156ED97467E3}" type="datetimeFigureOut">
               <a:rPr lang="en-US" smtClean="0"/>
-              <a:t>6/20/22</a:t>
+              <a:t>7/12/22</a:t>
             </a:fld>
             <a:endParaRPr lang="en-US"/>
           </a:p>
@@ -763,7 +763,7 @@
           <a:p>
             <a:fld id="{AE5C79E0-36D0-2B46-92E2-156ED97467E3}" type="datetimeFigureOut">
               <a:rPr lang="en-US" smtClean="0"/>
-              <a:t>6/20/22</a:t>
+              <a:t>7/12/22</a:t>
             </a:fld>
             <a:endParaRPr lang="en-US"/>
           </a:p>
@@ -1007,7 +1007,7 @@
           <a:p>
             <a:fld id="{AE5C79E0-36D0-2B46-92E2-156ED97467E3}" type="datetimeFigureOut">
               <a:rPr lang="en-US" smtClean="0"/>
-              <a:t>6/20/22</a:t>
+              <a:t>7/12/22</a:t>
             </a:fld>
             <a:endParaRPr lang="en-US"/>
           </a:p>
@@ -1239,7 +1239,7 @@
           <a:p>
             <a:fld id="{AE5C79E0-36D0-2B46-92E2-156ED97467E3}" type="datetimeFigureOut">
               <a:rPr lang="en-US" smtClean="0"/>
-              <a:t>6/20/22</a:t>
+              <a:t>7/12/22</a:t>
             </a:fld>
             <a:endParaRPr lang="en-US"/>
           </a:p>
@@ -1606,7 +1606,7 @@
           <a:p>
             <a:fld id="{AE5C79E0-36D0-2B46-92E2-156ED97467E3}" type="datetimeFigureOut">
               <a:rPr lang="en-US" smtClean="0"/>
-              <a:t>6/20/22</a:t>
+              <a:t>7/12/22</a:t>
             </a:fld>
             <a:endParaRPr lang="en-US"/>
           </a:p>
@@ -1724,7 +1724,7 @@
           <a:p>
             <a:fld id="{AE5C79E0-36D0-2B46-92E2-156ED97467E3}" type="datetimeFigureOut">
               <a:rPr lang="en-US" smtClean="0"/>
-              <a:t>6/20/22</a:t>
+              <a:t>7/12/22</a:t>
             </a:fld>
             <a:endParaRPr lang="en-US"/>
           </a:p>
@@ -1819,7 +1819,7 @@
           <a:p>
             <a:fld id="{AE5C79E0-36D0-2B46-92E2-156ED97467E3}" type="datetimeFigureOut">
               <a:rPr lang="en-US" smtClean="0"/>
-              <a:t>6/20/22</a:t>
+              <a:t>7/12/22</a:t>
             </a:fld>
             <a:endParaRPr lang="en-US"/>
           </a:p>
@@ -2096,7 +2096,7 @@
           <a:p>
             <a:fld id="{AE5C79E0-36D0-2B46-92E2-156ED97467E3}" type="datetimeFigureOut">
               <a:rPr lang="en-US" smtClean="0"/>
-              <a:t>6/20/22</a:t>
+              <a:t>7/12/22</a:t>
             </a:fld>
             <a:endParaRPr lang="en-US"/>
           </a:p>
@@ -2353,7 +2353,7 @@
           <a:p>
             <a:fld id="{AE5C79E0-36D0-2B46-92E2-156ED97467E3}" type="datetimeFigureOut">
               <a:rPr lang="en-US" smtClean="0"/>
-              <a:t>6/20/22</a:t>
+              <a:t>7/12/22</a:t>
             </a:fld>
             <a:endParaRPr lang="en-US"/>
           </a:p>
@@ -2566,7 +2566,7 @@
           <a:p>
             <a:fld id="{AE5C79E0-36D0-2B46-92E2-156ED97467E3}" type="datetimeFigureOut">
               <a:rPr lang="en-US" smtClean="0"/>
-              <a:t>6/20/22</a:t>
+              <a:t>7/12/22</a:t>
             </a:fld>
             <a:endParaRPr lang="en-US"/>
           </a:p>
@@ -11266,676 +11266,112 @@
             </p:txBody>
           </p:sp>
         </p:grpSp>
-        <p:grpSp>
-          <p:nvGrpSpPr>
-            <p:cNvPr id="471" name="Group 470">
+        <p:sp>
+          <p:nvSpPr>
+            <p:cNvPr id="472" name="TextBox 471">
               <a:extLst>
                 <a:ext uri="{FF2B5EF4-FFF2-40B4-BE49-F238E27FC236}">
-                  <a16:creationId xmlns:a16="http://schemas.microsoft.com/office/drawing/2014/main" id="{6D3640A9-38DC-4844-87AB-B639AE0C7059}"/>
+                  <a16:creationId xmlns:a16="http://schemas.microsoft.com/office/drawing/2014/main" id="{8F0EAA04-B138-354E-ABF3-5EA2C71A8B77}"/>
                 </a:ext>
               </a:extLst>
             </p:cNvPr>
-            <p:cNvGrpSpPr/>
+            <p:cNvSpPr txBox="1"/>
             <p:nvPr/>
-          </p:nvGrpSpPr>
-          <p:grpSpPr>
+          </p:nvSpPr>
+          <p:spPr>
             <a:xfrm>
               <a:off x="-293446" y="15545432"/>
               <a:ext cx="1952298" cy="1200329"/>
-              <a:chOff x="8633493" y="11018466"/>
-              <a:chExt cx="1952298" cy="1200329"/>
             </a:xfrm>
-          </p:grpSpPr>
-          <p:sp>
-            <p:nvSpPr>
-              <p:cNvPr id="472" name="TextBox 471">
-                <a:extLst>
-                  <a:ext uri="{FF2B5EF4-FFF2-40B4-BE49-F238E27FC236}">
-                    <a16:creationId xmlns:a16="http://schemas.microsoft.com/office/drawing/2014/main" id="{8F0EAA04-B138-354E-ABF3-5EA2C71A8B77}"/>
-                  </a:ext>
-                </a:extLst>
-              </p:cNvPr>
-              <p:cNvSpPr txBox="1"/>
-              <p:nvPr/>
-            </p:nvSpPr>
-            <p:spPr>
-              <a:xfrm>
-                <a:off x="8633493" y="11018466"/>
-                <a:ext cx="1952298" cy="1200329"/>
-              </a:xfrm>
-              <a:prstGeom prst="rect">
-                <a:avLst/>
-              </a:prstGeom>
-              <a:noFill/>
-            </p:spPr>
-            <p:txBody>
-              <a:bodyPr wrap="square">
-                <a:spAutoFit/>
-              </a:bodyPr>
-              <a:lstStyle/>
-              <a:p>
-                <a:r>
-                  <a:rPr lang="en-US" b="1" dirty="0"/>
-                  <a:t>Population from:</a:t>
-                </a:r>
-              </a:p>
-              <a:p>
-                <a:r>
-                  <a:rPr lang="en-US" dirty="0"/>
-                  <a:t>      Cherry</a:t>
-                </a:r>
-              </a:p>
-              <a:p>
-                <a:r>
-                  <a:rPr lang="en-US" dirty="0"/>
-                  <a:t>      Strawberry </a:t>
-                </a:r>
-              </a:p>
-              <a:p>
-                <a:r>
-                  <a:rPr lang="en-US" dirty="0"/>
-                  <a:t>      Blackberry</a:t>
-                </a:r>
-              </a:p>
-            </p:txBody>
-          </p:sp>
-          <p:grpSp>
-            <p:nvGrpSpPr>
-              <p:cNvPr id="473" name="Group 472">
-                <a:extLst>
-                  <a:ext uri="{FF2B5EF4-FFF2-40B4-BE49-F238E27FC236}">
-                    <a16:creationId xmlns:a16="http://schemas.microsoft.com/office/drawing/2014/main" id="{91A5E0B0-B832-3848-90C0-548A88C0A348}"/>
-                  </a:ext>
-                </a:extLst>
-              </p:cNvPr>
-              <p:cNvGrpSpPr/>
-              <p:nvPr/>
-            </p:nvGrpSpPr>
-            <p:grpSpPr>
-              <a:xfrm>
-                <a:off x="8810573" y="11899913"/>
-                <a:ext cx="137160" cy="274320"/>
-                <a:chOff x="10917758" y="2967123"/>
-                <a:chExt cx="137160" cy="274320"/>
-              </a:xfrm>
-            </p:grpSpPr>
-            <p:cxnSp>
-              <p:nvCxnSpPr>
-                <p:cNvPr id="480" name="Straight Connector 479">
-                  <a:extLst>
-                    <a:ext uri="{FF2B5EF4-FFF2-40B4-BE49-F238E27FC236}">
-                      <a16:creationId xmlns:a16="http://schemas.microsoft.com/office/drawing/2014/main" id="{12486844-6373-9142-ADF8-61AB37E4A11D}"/>
-                    </a:ext>
-                  </a:extLst>
-                </p:cNvPr>
-                <p:cNvCxnSpPr>
-                  <a:cxnSpLocks/>
-                </p:cNvCxnSpPr>
-                <p:nvPr/>
-              </p:nvCxnSpPr>
-              <p:spPr>
-                <a:xfrm>
-                  <a:off x="10986338" y="2967123"/>
-                  <a:ext cx="0" cy="274320"/>
-                </a:xfrm>
-                <a:prstGeom prst="line">
-                  <a:avLst/>
-                </a:prstGeom>
-                <a:ln w="28575">
-                  <a:solidFill>
-                    <a:srgbClr val="524D67"/>
-                  </a:solidFill>
-                </a:ln>
-              </p:spPr>
-              <p:style>
-                <a:lnRef idx="1">
-                  <a:schemeClr val="accent1"/>
-                </a:lnRef>
-                <a:fillRef idx="0">
-                  <a:schemeClr val="accent1"/>
-                </a:fillRef>
-                <a:effectRef idx="0">
-                  <a:schemeClr val="accent1"/>
-                </a:effectRef>
-                <a:fontRef idx="minor">
-                  <a:schemeClr val="tx1"/>
-                </a:fontRef>
-              </p:style>
-            </p:cxnSp>
-            <p:sp>
-              <p:nvSpPr>
-                <p:cNvPr id="481" name="Oval 480">
-                  <a:extLst>
-                    <a:ext uri="{FF2B5EF4-FFF2-40B4-BE49-F238E27FC236}">
-                      <a16:creationId xmlns:a16="http://schemas.microsoft.com/office/drawing/2014/main" id="{63A30F43-D9D8-D641-9F60-9355CC15FA76}"/>
-                    </a:ext>
-                  </a:extLst>
-                </p:cNvPr>
-                <p:cNvSpPr/>
-                <p:nvPr/>
-              </p:nvSpPr>
-              <p:spPr>
-                <a:xfrm>
-                  <a:off x="10917758" y="3035703"/>
-                  <a:ext cx="137160" cy="137160"/>
-                </a:xfrm>
-                <a:prstGeom prst="ellipse">
-                  <a:avLst/>
-                </a:prstGeom>
-                <a:solidFill>
-                  <a:srgbClr val="524D67"/>
-                </a:solidFill>
-                <a:ln>
-                  <a:solidFill>
-                    <a:srgbClr val="524D67"/>
-                  </a:solidFill>
-                </a:ln>
-              </p:spPr>
-              <p:style>
-                <a:lnRef idx="2">
-                  <a:schemeClr val="accent1">
-                    <a:shade val="50000"/>
-                  </a:schemeClr>
-                </a:lnRef>
-                <a:fillRef idx="1">
-                  <a:schemeClr val="accent1"/>
-                </a:fillRef>
-                <a:effectRef idx="0">
-                  <a:schemeClr val="accent1"/>
-                </a:effectRef>
-                <a:fontRef idx="minor">
-                  <a:schemeClr val="lt1"/>
-                </a:fontRef>
-              </p:style>
-              <p:txBody>
-                <a:bodyPr rtlCol="0" anchor="ctr"/>
-                <a:lstStyle/>
-                <a:p>
-                  <a:pPr algn="ctr"/>
-                  <a:endParaRPr lang="en-US"/>
-                </a:p>
-              </p:txBody>
-            </p:sp>
-          </p:grpSp>
-          <p:grpSp>
-            <p:nvGrpSpPr>
-              <p:cNvPr id="474" name="Group 473">
-                <a:extLst>
-                  <a:ext uri="{FF2B5EF4-FFF2-40B4-BE49-F238E27FC236}">
-                    <a16:creationId xmlns:a16="http://schemas.microsoft.com/office/drawing/2014/main" id="{91D2D9CA-2C1C-914A-8D4C-94FFE0E67EEA}"/>
-                  </a:ext>
-                </a:extLst>
-              </p:cNvPr>
-              <p:cNvGrpSpPr/>
-              <p:nvPr/>
-            </p:nvGrpSpPr>
-            <p:grpSpPr>
-              <a:xfrm>
-                <a:off x="8810573" y="11317502"/>
-                <a:ext cx="137160" cy="274320"/>
-                <a:chOff x="10825660" y="3733134"/>
-                <a:chExt cx="137160" cy="274320"/>
-              </a:xfrm>
-            </p:grpSpPr>
-            <p:sp>
-              <p:nvSpPr>
-                <p:cNvPr id="478" name="Oval 477">
-                  <a:extLst>
-                    <a:ext uri="{FF2B5EF4-FFF2-40B4-BE49-F238E27FC236}">
-                      <a16:creationId xmlns:a16="http://schemas.microsoft.com/office/drawing/2014/main" id="{F01DCCFD-AA21-B045-B711-54CD5002F45E}"/>
-                    </a:ext>
-                  </a:extLst>
-                </p:cNvPr>
-                <p:cNvSpPr/>
-                <p:nvPr/>
-              </p:nvSpPr>
-              <p:spPr>
-                <a:xfrm>
-                  <a:off x="10825660" y="3801714"/>
-                  <a:ext cx="137160" cy="137160"/>
-                </a:xfrm>
-                <a:prstGeom prst="ellipse">
-                  <a:avLst/>
-                </a:prstGeom>
-                <a:solidFill>
-                  <a:srgbClr val="BD3A6D"/>
-                </a:solidFill>
-                <a:ln w="12700">
-                  <a:solidFill>
-                    <a:srgbClr val="BD3A6D"/>
-                  </a:solidFill>
-                </a:ln>
-              </p:spPr>
-              <p:style>
-                <a:lnRef idx="2">
-                  <a:schemeClr val="accent1">
-                    <a:shade val="50000"/>
-                  </a:schemeClr>
-                </a:lnRef>
-                <a:fillRef idx="1">
-                  <a:schemeClr val="accent1"/>
-                </a:fillRef>
-                <a:effectRef idx="0">
-                  <a:schemeClr val="accent1"/>
-                </a:effectRef>
-                <a:fontRef idx="minor">
-                  <a:schemeClr val="lt1"/>
-                </a:fontRef>
-              </p:style>
-              <p:txBody>
-                <a:bodyPr rtlCol="0" anchor="ctr"/>
-                <a:lstStyle/>
-                <a:p>
-                  <a:pPr algn="ctr"/>
-                  <a:endParaRPr lang="en-US"/>
-                </a:p>
-              </p:txBody>
-            </p:sp>
-            <p:cxnSp>
-              <p:nvCxnSpPr>
-                <p:cNvPr id="479" name="Straight Connector 478">
-                  <a:extLst>
-                    <a:ext uri="{FF2B5EF4-FFF2-40B4-BE49-F238E27FC236}">
-                      <a16:creationId xmlns:a16="http://schemas.microsoft.com/office/drawing/2014/main" id="{3BFD1AEB-72A9-5E47-8D63-C9380E40842E}"/>
-                    </a:ext>
-                  </a:extLst>
-                </p:cNvPr>
-                <p:cNvCxnSpPr>
-                  <a:cxnSpLocks/>
-                </p:cNvCxnSpPr>
-                <p:nvPr/>
-              </p:nvCxnSpPr>
-              <p:spPr>
-                <a:xfrm>
-                  <a:off x="10894240" y="3733134"/>
-                  <a:ext cx="0" cy="274320"/>
-                </a:xfrm>
-                <a:prstGeom prst="line">
-                  <a:avLst/>
-                </a:prstGeom>
-                <a:ln w="28575">
-                  <a:solidFill>
-                    <a:srgbClr val="BD3A6D"/>
-                  </a:solidFill>
-                </a:ln>
-              </p:spPr>
-              <p:style>
-                <a:lnRef idx="1">
-                  <a:schemeClr val="accent1"/>
-                </a:lnRef>
-                <a:fillRef idx="0">
-                  <a:schemeClr val="accent1"/>
-                </a:fillRef>
-                <a:effectRef idx="0">
-                  <a:schemeClr val="accent1"/>
-                </a:effectRef>
-                <a:fontRef idx="minor">
-                  <a:schemeClr val="tx1"/>
-                </a:fontRef>
-              </p:style>
-            </p:cxnSp>
-          </p:grpSp>
-          <p:grpSp>
-            <p:nvGrpSpPr>
-              <p:cNvPr id="475" name="Group 474">
-                <a:extLst>
-                  <a:ext uri="{FF2B5EF4-FFF2-40B4-BE49-F238E27FC236}">
-                    <a16:creationId xmlns:a16="http://schemas.microsoft.com/office/drawing/2014/main" id="{9550B932-D3D2-8E4D-9ECF-75278DF45FAC}"/>
-                  </a:ext>
-                </a:extLst>
-              </p:cNvPr>
-              <p:cNvGrpSpPr/>
-              <p:nvPr/>
-            </p:nvGrpSpPr>
-            <p:grpSpPr>
-              <a:xfrm>
-                <a:off x="8810573" y="11614178"/>
-                <a:ext cx="137160" cy="274320"/>
-                <a:chOff x="9499652" y="2831064"/>
-                <a:chExt cx="137160" cy="274320"/>
-              </a:xfrm>
-            </p:grpSpPr>
-            <p:cxnSp>
-              <p:nvCxnSpPr>
-                <p:cNvPr id="476" name="Straight Connector 475">
-                  <a:extLst>
-                    <a:ext uri="{FF2B5EF4-FFF2-40B4-BE49-F238E27FC236}">
-                      <a16:creationId xmlns:a16="http://schemas.microsoft.com/office/drawing/2014/main" id="{8C8510EE-11A8-9242-8CB9-4FCA0FB29E1E}"/>
-                    </a:ext>
-                  </a:extLst>
-                </p:cNvPr>
-                <p:cNvCxnSpPr>
-                  <a:cxnSpLocks/>
-                </p:cNvCxnSpPr>
-                <p:nvPr/>
-              </p:nvCxnSpPr>
-              <p:spPr>
-                <a:xfrm>
-                  <a:off x="9568232" y="2831064"/>
-                  <a:ext cx="0" cy="274320"/>
-                </a:xfrm>
-                <a:prstGeom prst="line">
-                  <a:avLst/>
-                </a:prstGeom>
-                <a:ln w="28575">
-                  <a:solidFill>
-                    <a:srgbClr val="3AA791"/>
-                  </a:solidFill>
-                </a:ln>
-              </p:spPr>
-              <p:style>
-                <a:lnRef idx="1">
-                  <a:schemeClr val="accent1"/>
-                </a:lnRef>
-                <a:fillRef idx="0">
-                  <a:schemeClr val="accent1"/>
-                </a:fillRef>
-                <a:effectRef idx="0">
-                  <a:schemeClr val="accent1"/>
-                </a:effectRef>
-                <a:fontRef idx="minor">
-                  <a:schemeClr val="tx1"/>
-                </a:fontRef>
-              </p:style>
-            </p:cxnSp>
-            <p:sp>
-              <p:nvSpPr>
-                <p:cNvPr id="477" name="Oval 476">
-                  <a:extLst>
-                    <a:ext uri="{FF2B5EF4-FFF2-40B4-BE49-F238E27FC236}">
-                      <a16:creationId xmlns:a16="http://schemas.microsoft.com/office/drawing/2014/main" id="{0FCDCE9A-D500-4E49-888F-234667F38F59}"/>
-                    </a:ext>
-                  </a:extLst>
-                </p:cNvPr>
-                <p:cNvSpPr/>
-                <p:nvPr/>
-              </p:nvSpPr>
-              <p:spPr>
-                <a:xfrm>
-                  <a:off x="9499652" y="2899644"/>
-                  <a:ext cx="137160" cy="137160"/>
-                </a:xfrm>
-                <a:prstGeom prst="ellipse">
-                  <a:avLst/>
-                </a:prstGeom>
-                <a:solidFill>
-                  <a:srgbClr val="3AA791"/>
-                </a:solidFill>
-                <a:ln w="12700">
-                  <a:solidFill>
-                    <a:srgbClr val="3AA791"/>
-                  </a:solidFill>
-                </a:ln>
-              </p:spPr>
-              <p:style>
-                <a:lnRef idx="2">
-                  <a:schemeClr val="accent1">
-                    <a:shade val="50000"/>
-                  </a:schemeClr>
-                </a:lnRef>
-                <a:fillRef idx="1">
-                  <a:schemeClr val="accent1"/>
-                </a:fillRef>
-                <a:effectRef idx="0">
-                  <a:schemeClr val="accent1"/>
-                </a:effectRef>
-                <a:fontRef idx="minor">
-                  <a:schemeClr val="lt1"/>
-                </a:fontRef>
-              </p:style>
-              <p:txBody>
-                <a:bodyPr rtlCol="0" anchor="ctr"/>
-                <a:lstStyle/>
-                <a:p>
-                  <a:pPr algn="ctr"/>
-                  <a:r>
-                    <a:rPr lang="en-US" dirty="0"/>
-                    <a:t>  </a:t>
-                  </a:r>
-                </a:p>
-              </p:txBody>
-            </p:sp>
-          </p:grpSp>
-        </p:grpSp>
-        <p:grpSp>
-          <p:nvGrpSpPr>
-            <p:cNvPr id="482" name="Group 481">
+            <a:prstGeom prst="rect">
+              <a:avLst/>
+            </a:prstGeom>
+            <a:noFill/>
+          </p:spPr>
+          <p:txBody>
+            <a:bodyPr wrap="square">
+              <a:spAutoFit/>
+            </a:bodyPr>
+            <a:lstStyle/>
+            <a:p>
+              <a:r>
+                <a:rPr lang="en-US" b="1" dirty="0"/>
+                <a:t>Population from:</a:t>
+              </a:r>
+            </a:p>
+            <a:p>
+              <a:r>
+                <a:rPr lang="en-US" dirty="0"/>
+                <a:t>      Cherry</a:t>
+              </a:r>
+            </a:p>
+            <a:p>
+              <a:r>
+                <a:rPr lang="en-US" dirty="0"/>
+                <a:t>      Strawberry </a:t>
+              </a:r>
+            </a:p>
+            <a:p>
+              <a:r>
+                <a:rPr lang="en-US" dirty="0"/>
+                <a:t>      Blackberry</a:t>
+              </a:r>
+            </a:p>
+          </p:txBody>
+        </p:sp>
+        <p:sp>
+          <p:nvSpPr>
+            <p:cNvPr id="483" name="TextBox 482">
               <a:extLst>
                 <a:ext uri="{FF2B5EF4-FFF2-40B4-BE49-F238E27FC236}">
-                  <a16:creationId xmlns:a16="http://schemas.microsoft.com/office/drawing/2014/main" id="{B768A7D5-AE1F-6F4E-9602-7770062454D3}"/>
+                  <a16:creationId xmlns:a16="http://schemas.microsoft.com/office/drawing/2014/main" id="{7FDB4BCF-E747-2F46-ABD2-19CFE8D1697F}"/>
                 </a:ext>
               </a:extLst>
             </p:cNvPr>
-            <p:cNvGrpSpPr/>
+            <p:cNvSpPr txBox="1"/>
             <p:nvPr/>
-          </p:nvGrpSpPr>
-          <p:grpSpPr>
+          </p:nvSpPr>
+          <p:spPr>
             <a:xfrm>
               <a:off x="-6038104" y="15545432"/>
               <a:ext cx="1952298" cy="1200329"/>
-              <a:chOff x="886601" y="10994345"/>
-              <a:chExt cx="1952298" cy="1200329"/>
             </a:xfrm>
-          </p:grpSpPr>
-          <p:sp>
-            <p:nvSpPr>
-              <p:cNvPr id="483" name="TextBox 482">
-                <a:extLst>
-                  <a:ext uri="{FF2B5EF4-FFF2-40B4-BE49-F238E27FC236}">
-                    <a16:creationId xmlns:a16="http://schemas.microsoft.com/office/drawing/2014/main" id="{7FDB4BCF-E747-2F46-ABD2-19CFE8D1697F}"/>
-                  </a:ext>
-                </a:extLst>
-              </p:cNvPr>
-              <p:cNvSpPr txBox="1"/>
-              <p:nvPr/>
-            </p:nvSpPr>
-            <p:spPr>
-              <a:xfrm>
-                <a:off x="886601" y="10994345"/>
-                <a:ext cx="1952298" cy="1200329"/>
-              </a:xfrm>
-              <a:prstGeom prst="rect">
-                <a:avLst/>
-              </a:prstGeom>
-              <a:noFill/>
-            </p:spPr>
-            <p:txBody>
-              <a:bodyPr wrap="square">
-                <a:spAutoFit/>
-              </a:bodyPr>
-              <a:lstStyle/>
-              <a:p>
-                <a:r>
-                  <a:rPr lang="en-US" b="1" dirty="0"/>
-                  <a:t>Population from:</a:t>
-                </a:r>
-              </a:p>
-              <a:p>
-                <a:r>
-                  <a:rPr lang="en-US" dirty="0"/>
-                  <a:t>      Cherry</a:t>
-                </a:r>
-              </a:p>
-              <a:p>
-                <a:r>
-                  <a:rPr lang="en-US" dirty="0"/>
-                  <a:t>      Strawberry </a:t>
-                </a:r>
-              </a:p>
-              <a:p>
-                <a:r>
-                  <a:rPr lang="en-US" dirty="0"/>
-                  <a:t>      Blackberry</a:t>
-                </a:r>
-              </a:p>
-            </p:txBody>
-          </p:sp>
-          <p:sp>
-            <p:nvSpPr>
-              <p:cNvPr id="484" name="Oval 483">
-                <a:extLst>
-                  <a:ext uri="{FF2B5EF4-FFF2-40B4-BE49-F238E27FC236}">
-                    <a16:creationId xmlns:a16="http://schemas.microsoft.com/office/drawing/2014/main" id="{955B44DA-4C49-E248-94AD-ED4A7F00A58C}"/>
-                  </a:ext>
-                </a:extLst>
-              </p:cNvPr>
-              <p:cNvSpPr/>
-              <p:nvPr/>
-            </p:nvSpPr>
-            <p:spPr>
-              <a:xfrm>
-                <a:off x="1063681" y="11944372"/>
-                <a:ext cx="164592" cy="164592"/>
-              </a:xfrm>
-              <a:prstGeom prst="ellipse">
-                <a:avLst/>
-              </a:prstGeom>
-              <a:solidFill>
-                <a:srgbClr val="524D67"/>
-              </a:solidFill>
-              <a:ln>
-                <a:solidFill>
-                  <a:srgbClr val="524D67"/>
-                </a:solidFill>
-              </a:ln>
-            </p:spPr>
-            <p:style>
-              <a:lnRef idx="2">
-                <a:schemeClr val="accent1">
-                  <a:shade val="50000"/>
-                </a:schemeClr>
-              </a:lnRef>
-              <a:fillRef idx="1">
-                <a:schemeClr val="accent1"/>
-              </a:fillRef>
-              <a:effectRef idx="0">
-                <a:schemeClr val="accent1"/>
-              </a:effectRef>
-              <a:fontRef idx="minor">
-                <a:schemeClr val="lt1"/>
-              </a:fontRef>
-            </p:style>
-            <p:txBody>
-              <a:bodyPr rtlCol="0" anchor="ctr"/>
-              <a:lstStyle/>
-              <a:p>
-                <a:pPr algn="ctr"/>
-                <a:endParaRPr lang="en-US"/>
-              </a:p>
-            </p:txBody>
-          </p:sp>
-          <p:sp>
-            <p:nvSpPr>
-              <p:cNvPr id="485" name="Oval 484">
-                <a:extLst>
-                  <a:ext uri="{FF2B5EF4-FFF2-40B4-BE49-F238E27FC236}">
-                    <a16:creationId xmlns:a16="http://schemas.microsoft.com/office/drawing/2014/main" id="{A76C69A3-F2D1-F44E-A4C7-0ECB70CD27E9}"/>
-                  </a:ext>
-                </a:extLst>
-              </p:cNvPr>
-              <p:cNvSpPr/>
-              <p:nvPr/>
-            </p:nvSpPr>
-            <p:spPr>
-              <a:xfrm>
-                <a:off x="1063681" y="11361961"/>
-                <a:ext cx="164592" cy="164592"/>
-              </a:xfrm>
-              <a:prstGeom prst="ellipse">
-                <a:avLst/>
-              </a:prstGeom>
-              <a:solidFill>
-                <a:srgbClr val="BD3A6D"/>
-              </a:solidFill>
-              <a:ln w="12700">
-                <a:solidFill>
-                  <a:srgbClr val="BD3A6D"/>
-                </a:solidFill>
-              </a:ln>
-            </p:spPr>
-            <p:style>
-              <a:lnRef idx="2">
-                <a:schemeClr val="accent1">
-                  <a:shade val="50000"/>
-                </a:schemeClr>
-              </a:lnRef>
-              <a:fillRef idx="1">
-                <a:schemeClr val="accent1"/>
-              </a:fillRef>
-              <a:effectRef idx="0">
-                <a:schemeClr val="accent1"/>
-              </a:effectRef>
-              <a:fontRef idx="minor">
-                <a:schemeClr val="lt1"/>
-              </a:fontRef>
-            </p:style>
-            <p:txBody>
-              <a:bodyPr rtlCol="0" anchor="ctr"/>
-              <a:lstStyle/>
-              <a:p>
-                <a:pPr algn="ctr"/>
-                <a:endParaRPr lang="en-US"/>
-              </a:p>
-            </p:txBody>
-          </p:sp>
-          <p:sp>
-            <p:nvSpPr>
-              <p:cNvPr id="486" name="Oval 485">
-                <a:extLst>
-                  <a:ext uri="{FF2B5EF4-FFF2-40B4-BE49-F238E27FC236}">
-                    <a16:creationId xmlns:a16="http://schemas.microsoft.com/office/drawing/2014/main" id="{36D92A92-68E0-6948-AD02-9F64AEE9067C}"/>
-                  </a:ext>
-                </a:extLst>
-              </p:cNvPr>
-              <p:cNvSpPr/>
-              <p:nvPr/>
-            </p:nvSpPr>
-            <p:spPr>
-              <a:xfrm>
-                <a:off x="1063681" y="11658637"/>
-                <a:ext cx="164592" cy="164592"/>
-              </a:xfrm>
-              <a:prstGeom prst="ellipse">
-                <a:avLst/>
-              </a:prstGeom>
-              <a:solidFill>
-                <a:srgbClr val="3AA791"/>
-              </a:solidFill>
-              <a:ln w="12700">
-                <a:solidFill>
-                  <a:srgbClr val="3AA791"/>
-                </a:solidFill>
-              </a:ln>
-            </p:spPr>
-            <p:style>
-              <a:lnRef idx="2">
-                <a:schemeClr val="accent1">
-                  <a:shade val="50000"/>
-                </a:schemeClr>
-              </a:lnRef>
-              <a:fillRef idx="1">
-                <a:schemeClr val="accent1"/>
-              </a:fillRef>
-              <a:effectRef idx="0">
-                <a:schemeClr val="accent1"/>
-              </a:effectRef>
-              <a:fontRef idx="minor">
-                <a:schemeClr val="lt1"/>
-              </a:fontRef>
-            </p:style>
-            <p:txBody>
-              <a:bodyPr rtlCol="0" anchor="ctr"/>
-              <a:lstStyle/>
-              <a:p>
-                <a:pPr algn="ctr"/>
-                <a:r>
-                  <a:rPr lang="en-US" dirty="0"/>
-                  <a:t>  </a:t>
-                </a:r>
-              </a:p>
-            </p:txBody>
-          </p:sp>
-        </p:grpSp>
+            <a:prstGeom prst="rect">
+              <a:avLst/>
+            </a:prstGeom>
+            <a:noFill/>
+          </p:spPr>
+          <p:txBody>
+            <a:bodyPr wrap="square">
+              <a:spAutoFit/>
+            </a:bodyPr>
+            <a:lstStyle/>
+            <a:p>
+              <a:r>
+                <a:rPr lang="en-US" b="1" dirty="0"/>
+                <a:t>Population from:</a:t>
+              </a:r>
+            </a:p>
+            <a:p>
+              <a:r>
+                <a:rPr lang="en-US" dirty="0"/>
+                <a:t>      Cherry</a:t>
+              </a:r>
+            </a:p>
+            <a:p>
+              <a:r>
+                <a:rPr lang="en-US" dirty="0"/>
+                <a:t>      Strawberry </a:t>
+              </a:r>
+            </a:p>
+            <a:p>
+              <a:r>
+                <a:rPr lang="en-US" dirty="0"/>
+                <a:t>      Blackberry</a:t>
+              </a:r>
+            </a:p>
+          </p:txBody>
+        </p:sp>
       </p:grpSp>
       <p:grpSp>
         <p:nvGrpSpPr>
@@ -17302,6 +16738,360 @@
             </p:txBody>
           </p:sp>
         </p:grpSp>
+      </p:grpSp>
+      <p:grpSp>
+        <p:nvGrpSpPr>
+          <p:cNvPr id="12" name="Group 11">
+            <a:extLst>
+              <a:ext uri="{FF2B5EF4-FFF2-40B4-BE49-F238E27FC236}">
+                <a16:creationId xmlns:a16="http://schemas.microsoft.com/office/drawing/2014/main" id="{9663DE43-C4C3-F057-52BE-30B5930FD430}"/>
+              </a:ext>
+            </a:extLst>
+          </p:cNvPr>
+          <p:cNvGrpSpPr/>
+          <p:nvPr/>
+        </p:nvGrpSpPr>
+        <p:grpSpPr>
+          <a:xfrm>
+            <a:off x="6686443" y="16036836"/>
+            <a:ext cx="278854" cy="755855"/>
+            <a:chOff x="10935031" y="13501691"/>
+            <a:chExt cx="247817" cy="650528"/>
+          </a:xfrm>
+        </p:grpSpPr>
+        <p:sp>
+          <p:nvSpPr>
+            <p:cNvPr id="13" name="Rectangle 12">
+              <a:extLst>
+                <a:ext uri="{FF2B5EF4-FFF2-40B4-BE49-F238E27FC236}">
+                  <a16:creationId xmlns:a16="http://schemas.microsoft.com/office/drawing/2014/main" id="{DD6F8802-BD1B-9B66-6D39-2AAC1F1743F2}"/>
+                </a:ext>
+              </a:extLst>
+            </p:cNvPr>
+            <p:cNvSpPr/>
+            <p:nvPr/>
+          </p:nvSpPr>
+          <p:spPr>
+            <a:xfrm>
+              <a:off x="10935031" y="13501691"/>
+              <a:ext cx="247816" cy="215686"/>
+            </a:xfrm>
+            <a:prstGeom prst="rect">
+              <a:avLst/>
+            </a:prstGeom>
+            <a:solidFill>
+              <a:srgbClr val="BD3A6D"/>
+            </a:solidFill>
+            <a:ln>
+              <a:noFill/>
+            </a:ln>
+          </p:spPr>
+          <p:style>
+            <a:lnRef idx="2">
+              <a:schemeClr val="accent1">
+                <a:shade val="50000"/>
+              </a:schemeClr>
+            </a:lnRef>
+            <a:fillRef idx="1">
+              <a:schemeClr val="accent1"/>
+            </a:fillRef>
+            <a:effectRef idx="0">
+              <a:schemeClr val="accent1"/>
+            </a:effectRef>
+            <a:fontRef idx="minor">
+              <a:schemeClr val="lt1"/>
+            </a:fontRef>
+          </p:style>
+          <p:txBody>
+            <a:bodyPr rtlCol="0" anchor="ctr"/>
+            <a:lstStyle/>
+            <a:p>
+              <a:pPr algn="ctr"/>
+              <a:endParaRPr lang="en-US"/>
+            </a:p>
+          </p:txBody>
+        </p:sp>
+        <p:sp>
+          <p:nvSpPr>
+            <p:cNvPr id="15" name="Rectangle 14">
+              <a:extLst>
+                <a:ext uri="{FF2B5EF4-FFF2-40B4-BE49-F238E27FC236}">
+                  <a16:creationId xmlns:a16="http://schemas.microsoft.com/office/drawing/2014/main" id="{948E501B-2631-DF99-8416-FBA8C4537F79}"/>
+                </a:ext>
+              </a:extLst>
+            </p:cNvPr>
+            <p:cNvSpPr/>
+            <p:nvPr/>
+          </p:nvSpPr>
+          <p:spPr>
+            <a:xfrm>
+              <a:off x="10935032" y="13703062"/>
+              <a:ext cx="247816" cy="215686"/>
+            </a:xfrm>
+            <a:prstGeom prst="rect">
+              <a:avLst/>
+            </a:prstGeom>
+            <a:solidFill>
+              <a:srgbClr val="3AA791"/>
+            </a:solidFill>
+            <a:ln>
+              <a:noFill/>
+            </a:ln>
+          </p:spPr>
+          <p:style>
+            <a:lnRef idx="2">
+              <a:schemeClr val="accent1">
+                <a:shade val="50000"/>
+              </a:schemeClr>
+            </a:lnRef>
+            <a:fillRef idx="1">
+              <a:schemeClr val="accent1"/>
+            </a:fillRef>
+            <a:effectRef idx="0">
+              <a:schemeClr val="accent1"/>
+            </a:effectRef>
+            <a:fontRef idx="minor">
+              <a:schemeClr val="lt1"/>
+            </a:fontRef>
+          </p:style>
+          <p:txBody>
+            <a:bodyPr rtlCol="0" anchor="ctr"/>
+            <a:lstStyle/>
+            <a:p>
+              <a:pPr algn="ctr"/>
+              <a:endParaRPr lang="en-US"/>
+            </a:p>
+          </p:txBody>
+        </p:sp>
+        <p:sp>
+          <p:nvSpPr>
+            <p:cNvPr id="16" name="Rectangle 15">
+              <a:extLst>
+                <a:ext uri="{FF2B5EF4-FFF2-40B4-BE49-F238E27FC236}">
+                  <a16:creationId xmlns:a16="http://schemas.microsoft.com/office/drawing/2014/main" id="{A7F363A6-1FA1-A375-953D-70CA58178405}"/>
+                </a:ext>
+              </a:extLst>
+            </p:cNvPr>
+            <p:cNvSpPr/>
+            <p:nvPr/>
+          </p:nvSpPr>
+          <p:spPr>
+            <a:xfrm>
+              <a:off x="10935031" y="13936533"/>
+              <a:ext cx="247816" cy="215686"/>
+            </a:xfrm>
+            <a:prstGeom prst="rect">
+              <a:avLst/>
+            </a:prstGeom>
+            <a:solidFill>
+              <a:srgbClr val="524D67"/>
+            </a:solidFill>
+            <a:ln>
+              <a:noFill/>
+            </a:ln>
+          </p:spPr>
+          <p:style>
+            <a:lnRef idx="2">
+              <a:schemeClr val="accent1">
+                <a:shade val="50000"/>
+              </a:schemeClr>
+            </a:lnRef>
+            <a:fillRef idx="1">
+              <a:schemeClr val="accent1"/>
+            </a:fillRef>
+            <a:effectRef idx="0">
+              <a:schemeClr val="accent1"/>
+            </a:effectRef>
+            <a:fontRef idx="minor">
+              <a:schemeClr val="lt1"/>
+            </a:fontRef>
+          </p:style>
+          <p:txBody>
+            <a:bodyPr rtlCol="0" anchor="ctr"/>
+            <a:lstStyle/>
+            <a:p>
+              <a:pPr algn="ctr"/>
+              <a:endParaRPr lang="en-US"/>
+            </a:p>
+          </p:txBody>
+        </p:sp>
+      </p:grpSp>
+      <p:grpSp>
+        <p:nvGrpSpPr>
+          <p:cNvPr id="17" name="Group 16">
+            <a:extLst>
+              <a:ext uri="{FF2B5EF4-FFF2-40B4-BE49-F238E27FC236}">
+                <a16:creationId xmlns:a16="http://schemas.microsoft.com/office/drawing/2014/main" id="{7C4A016B-E221-8304-EFAA-5E926EE621D4}"/>
+              </a:ext>
+            </a:extLst>
+          </p:cNvPr>
+          <p:cNvGrpSpPr/>
+          <p:nvPr/>
+        </p:nvGrpSpPr>
+        <p:grpSpPr>
+          <a:xfrm>
+            <a:off x="955754" y="16029165"/>
+            <a:ext cx="278854" cy="755855"/>
+            <a:chOff x="10935031" y="13501691"/>
+            <a:chExt cx="247817" cy="650528"/>
+          </a:xfrm>
+        </p:grpSpPr>
+        <p:sp>
+          <p:nvSpPr>
+            <p:cNvPr id="18" name="Rectangle 17">
+              <a:extLst>
+                <a:ext uri="{FF2B5EF4-FFF2-40B4-BE49-F238E27FC236}">
+                  <a16:creationId xmlns:a16="http://schemas.microsoft.com/office/drawing/2014/main" id="{98A43745-6230-1F57-0953-6A166E12216E}"/>
+                </a:ext>
+              </a:extLst>
+            </p:cNvPr>
+            <p:cNvSpPr/>
+            <p:nvPr/>
+          </p:nvSpPr>
+          <p:spPr>
+            <a:xfrm>
+              <a:off x="10935031" y="13501691"/>
+              <a:ext cx="247816" cy="215686"/>
+            </a:xfrm>
+            <a:prstGeom prst="rect">
+              <a:avLst/>
+            </a:prstGeom>
+            <a:solidFill>
+              <a:srgbClr val="BD3A6D"/>
+            </a:solidFill>
+            <a:ln>
+              <a:noFill/>
+            </a:ln>
+          </p:spPr>
+          <p:style>
+            <a:lnRef idx="2">
+              <a:schemeClr val="accent1">
+                <a:shade val="50000"/>
+              </a:schemeClr>
+            </a:lnRef>
+            <a:fillRef idx="1">
+              <a:schemeClr val="accent1"/>
+            </a:fillRef>
+            <a:effectRef idx="0">
+              <a:schemeClr val="accent1"/>
+            </a:effectRef>
+            <a:fontRef idx="minor">
+              <a:schemeClr val="lt1"/>
+            </a:fontRef>
+          </p:style>
+          <p:txBody>
+            <a:bodyPr rtlCol="0" anchor="ctr"/>
+            <a:lstStyle/>
+            <a:p>
+              <a:pPr algn="ctr"/>
+              <a:endParaRPr lang="en-US"/>
+            </a:p>
+          </p:txBody>
+        </p:sp>
+        <p:sp>
+          <p:nvSpPr>
+            <p:cNvPr id="19" name="Rectangle 18">
+              <a:extLst>
+                <a:ext uri="{FF2B5EF4-FFF2-40B4-BE49-F238E27FC236}">
+                  <a16:creationId xmlns:a16="http://schemas.microsoft.com/office/drawing/2014/main" id="{62F6DDCA-EC53-1507-A6B7-61FE84CE4107}"/>
+                </a:ext>
+              </a:extLst>
+            </p:cNvPr>
+            <p:cNvSpPr/>
+            <p:nvPr/>
+          </p:nvSpPr>
+          <p:spPr>
+            <a:xfrm>
+              <a:off x="10935032" y="13724332"/>
+              <a:ext cx="247816" cy="215686"/>
+            </a:xfrm>
+            <a:prstGeom prst="rect">
+              <a:avLst/>
+            </a:prstGeom>
+            <a:solidFill>
+              <a:srgbClr val="3AA791"/>
+            </a:solidFill>
+            <a:ln>
+              <a:noFill/>
+            </a:ln>
+          </p:spPr>
+          <p:style>
+            <a:lnRef idx="2">
+              <a:schemeClr val="accent1">
+                <a:shade val="50000"/>
+              </a:schemeClr>
+            </a:lnRef>
+            <a:fillRef idx="1">
+              <a:schemeClr val="accent1"/>
+            </a:fillRef>
+            <a:effectRef idx="0">
+              <a:schemeClr val="accent1"/>
+            </a:effectRef>
+            <a:fontRef idx="minor">
+              <a:schemeClr val="lt1"/>
+            </a:fontRef>
+          </p:style>
+          <p:txBody>
+            <a:bodyPr rtlCol="0" anchor="ctr"/>
+            <a:lstStyle/>
+            <a:p>
+              <a:pPr algn="ctr"/>
+              <a:endParaRPr lang="en-US"/>
+            </a:p>
+          </p:txBody>
+        </p:sp>
+        <p:sp>
+          <p:nvSpPr>
+            <p:cNvPr id="20" name="Rectangle 19">
+              <a:extLst>
+                <a:ext uri="{FF2B5EF4-FFF2-40B4-BE49-F238E27FC236}">
+                  <a16:creationId xmlns:a16="http://schemas.microsoft.com/office/drawing/2014/main" id="{807C7D56-80F5-38F2-0094-659CB43B8AA1}"/>
+                </a:ext>
+              </a:extLst>
+            </p:cNvPr>
+            <p:cNvSpPr/>
+            <p:nvPr/>
+          </p:nvSpPr>
+          <p:spPr>
+            <a:xfrm>
+              <a:off x="10935031" y="13936533"/>
+              <a:ext cx="247816" cy="215686"/>
+            </a:xfrm>
+            <a:prstGeom prst="rect">
+              <a:avLst/>
+            </a:prstGeom>
+            <a:solidFill>
+              <a:srgbClr val="524D67"/>
+            </a:solidFill>
+            <a:ln>
+              <a:noFill/>
+            </a:ln>
+          </p:spPr>
+          <p:style>
+            <a:lnRef idx="2">
+              <a:schemeClr val="accent1">
+                <a:shade val="50000"/>
+              </a:schemeClr>
+            </a:lnRef>
+            <a:fillRef idx="1">
+              <a:schemeClr val="accent1"/>
+            </a:fillRef>
+            <a:effectRef idx="0">
+              <a:schemeClr val="accent1"/>
+            </a:effectRef>
+            <a:fontRef idx="minor">
+              <a:schemeClr val="lt1"/>
+            </a:fontRef>
+          </p:style>
+          <p:txBody>
+            <a:bodyPr rtlCol="0" anchor="ctr"/>
+            <a:lstStyle/>
+            <a:p>
+              <a:pPr algn="ctr"/>
+              <a:endParaRPr lang="en-US"/>
+            </a:p>
+          </p:txBody>
+        </p:sp>
       </p:grpSp>
     </p:spTree>
     <p:extLst>

</xml_diff>